<commit_message>
final with xgb and svc fine tuning results
</commit_message>
<xml_diff>
--- a/PROJECT_PRESENTATION.pptx
+++ b/PROJECT_PRESENTATION.pptx
@@ -9624,8 +9624,23 @@
           <a:lstStyle/>
           <a:p>
             <a:r>
-              <a:rPr lang="en-US" dirty="0"/>
-              <a:t>FINAL TAKEAWAYS</a:t>
+              <a:rPr lang="en-US" sz="2400" dirty="0"/>
+              <a:t>Best model is SVC</a:t>
+            </a:r>
+            <a:br>
+              <a:rPr lang="en-US" sz="2400" dirty="0"/>
+            </a:br>
+            <a:r>
+              <a:rPr lang="en-US" sz="2400" dirty="0"/>
+              <a:t>but let’s give a chance to </a:t>
+            </a:r>
+            <a:r>
+              <a:rPr lang="en-US" sz="2400" dirty="0" err="1"/>
+              <a:t>XGBoost</a:t>
+            </a:r>
+            <a:r>
+              <a:rPr lang="en-US" sz="2400" dirty="0"/>
+              <a:t> too, to see how fine tuning can improve relevant scores of the both models</a:t>
             </a:r>
           </a:p>
         </p:txBody>
@@ -9726,9 +9741,85 @@
         </p:blipFill>
         <p:spPr>
           <a:xfrm>
-            <a:off x="2693545" y="1965856"/>
-            <a:ext cx="6344535" cy="3762900"/>
+            <a:off x="481167" y="2569387"/>
+            <a:ext cx="4706114" cy="3238818"/>
           </a:xfrm>
+        </p:spPr>
+      </p:pic>
+      <p:sp>
+        <p:nvSpPr>
+          <p:cNvPr id="6" name="Arrow: Right 5">
+            <a:extLst>
+              <a:ext uri="{FF2B5EF4-FFF2-40B4-BE49-F238E27FC236}">
+                <a16:creationId xmlns:a16="http://schemas.microsoft.com/office/drawing/2014/main" id="{2472BF98-4B27-7EA5-D5E9-389D13A3D2BA}"/>
+              </a:ext>
+            </a:extLst>
+          </p:cNvPr>
+          <p:cNvSpPr/>
+          <p:nvPr/>
+        </p:nvSpPr>
+        <p:spPr>
+          <a:xfrm>
+            <a:off x="5401557" y="3691067"/>
+            <a:ext cx="727788" cy="209939"/>
+          </a:xfrm>
+          <a:prstGeom prst="rightArrow">
+            <a:avLst/>
+          </a:prstGeom>
+        </p:spPr>
+        <p:style>
+          <a:lnRef idx="2">
+            <a:schemeClr val="accent1">
+              <a:shade val="15000"/>
+            </a:schemeClr>
+          </a:lnRef>
+          <a:fillRef idx="1">
+            <a:schemeClr val="accent1"/>
+          </a:fillRef>
+          <a:effectRef idx="0">
+            <a:schemeClr val="accent1"/>
+          </a:effectRef>
+          <a:fontRef idx="minor">
+            <a:schemeClr val="lt1"/>
+          </a:fontRef>
+        </p:style>
+        <p:txBody>
+          <a:bodyPr rtlCol="0" anchor="ctr"/>
+          <a:lstStyle/>
+          <a:p>
+            <a:pPr algn="ctr"/>
+            <a:endParaRPr lang="en-US"/>
+          </a:p>
+        </p:txBody>
+      </p:sp>
+      <p:pic>
+        <p:nvPicPr>
+          <p:cNvPr id="8" name="Picture 7">
+            <a:extLst>
+              <a:ext uri="{FF2B5EF4-FFF2-40B4-BE49-F238E27FC236}">
+                <a16:creationId xmlns:a16="http://schemas.microsoft.com/office/drawing/2014/main" id="{80354C33-F9BF-0DD5-E8F9-7A4792D8FEFE}"/>
+              </a:ext>
+            </a:extLst>
+          </p:cNvPr>
+          <p:cNvPicPr>
+            <a:picLocks noChangeAspect="1"/>
+          </p:cNvPicPr>
+          <p:nvPr/>
+        </p:nvPicPr>
+        <p:blipFill>
+          <a:blip r:embed="rId4"/>
+          <a:stretch>
+            <a:fillRect/>
+          </a:stretch>
+        </p:blipFill>
+        <p:spPr>
+          <a:xfrm>
+            <a:off x="6343621" y="2905877"/>
+            <a:ext cx="5708004" cy="2995204"/>
+          </a:xfrm>
+          <a:prstGeom prst="rect">
+            <a:avLst/>
+          </a:prstGeom>
         </p:spPr>
       </p:pic>
     </p:spTree>
@@ -9761,40 +9852,6 @@
           <a:chExt cx="0" cy="0"/>
         </a:xfrm>
       </p:grpSpPr>
-      <p:sp>
-        <p:nvSpPr>
-          <p:cNvPr id="2" name="Title 1">
-            <a:extLst>
-              <a:ext uri="{FF2B5EF4-FFF2-40B4-BE49-F238E27FC236}">
-                <a16:creationId xmlns:a16="http://schemas.microsoft.com/office/drawing/2014/main" id="{5D030A76-B788-B363-104E-266B7C7F7208}"/>
-              </a:ext>
-            </a:extLst>
-          </p:cNvPr>
-          <p:cNvSpPr>
-            <a:spLocks noGrp="1"/>
-          </p:cNvSpPr>
-          <p:nvPr>
-            <p:ph type="title"/>
-          </p:nvPr>
-        </p:nvSpPr>
-        <p:spPr>
-          <a:xfrm>
-            <a:off x="838200" y="365760"/>
-            <a:ext cx="10515600" cy="747423"/>
-          </a:xfrm>
-          <a:noFill/>
-        </p:spPr>
-        <p:txBody>
-          <a:bodyPr anchor="ctr"/>
-          <a:lstStyle/>
-          <a:p>
-            <a:r>
-              <a:rPr lang="en-US" dirty="0"/>
-              <a:t>FINAL TAKEAWAYS</a:t>
-            </a:r>
-          </a:p>
-        </p:txBody>
-      </p:sp>
       <p:sp>
         <p:nvSpPr>
           <p:cNvPr id="5" name="Rectangle 4">
@@ -9891,17 +9948,17 @@
         </p:blipFill>
         <p:spPr>
           <a:xfrm>
-            <a:off x="838200" y="1857539"/>
-            <a:ext cx="5133975" cy="3979535"/>
+            <a:off x="838200" y="1857540"/>
+            <a:ext cx="3071077" cy="2380506"/>
           </a:xfrm>
         </p:spPr>
       </p:pic>
       <p:pic>
         <p:nvPicPr>
-          <p:cNvPr id="17" name="Picture 16">
+          <p:cNvPr id="4" name="Picture 3">
             <a:extLst>
               <a:ext uri="{FF2B5EF4-FFF2-40B4-BE49-F238E27FC236}">
-                <a16:creationId xmlns:a16="http://schemas.microsoft.com/office/drawing/2014/main" id="{F9A4006F-0404-6987-1586-3EECDAD13AA0}"/>
+                <a16:creationId xmlns:a16="http://schemas.microsoft.com/office/drawing/2014/main" id="{FBBC1361-E2EE-5966-82B4-487B841BC10A}"/>
               </a:ext>
             </a:extLst>
           </p:cNvPr>
@@ -9918,8 +9975,244 @@
         </p:blipFill>
         <p:spPr>
           <a:xfrm>
-            <a:off x="6096000" y="1857539"/>
-            <a:ext cx="5820587" cy="2343477"/>
+            <a:off x="6294472" y="4305509"/>
+            <a:ext cx="5771568" cy="2006406"/>
+          </a:xfrm>
+          <a:prstGeom prst="rect">
+            <a:avLst/>
+          </a:prstGeom>
+        </p:spPr>
+      </p:pic>
+      <p:pic>
+        <p:nvPicPr>
+          <p:cNvPr id="7" name="Picture 6">
+            <a:extLst>
+              <a:ext uri="{FF2B5EF4-FFF2-40B4-BE49-F238E27FC236}">
+                <a16:creationId xmlns:a16="http://schemas.microsoft.com/office/drawing/2014/main" id="{07195F9C-3493-F569-F3E9-E190E38AF684}"/>
+              </a:ext>
+            </a:extLst>
+          </p:cNvPr>
+          <p:cNvPicPr>
+            <a:picLocks noChangeAspect="1"/>
+          </p:cNvPicPr>
+          <p:nvPr/>
+        </p:nvPicPr>
+        <p:blipFill>
+          <a:blip r:embed="rId5"/>
+          <a:stretch>
+            <a:fillRect/>
+          </a:stretch>
+        </p:blipFill>
+        <p:spPr>
+          <a:xfrm>
+            <a:off x="6294472" y="1857540"/>
+            <a:ext cx="5753903" cy="2006405"/>
+          </a:xfrm>
+          <a:prstGeom prst="rect">
+            <a:avLst/>
+          </a:prstGeom>
+        </p:spPr>
+      </p:pic>
+      <p:sp>
+        <p:nvSpPr>
+          <p:cNvPr id="8" name="TextBox 7">
+            <a:extLst>
+              <a:ext uri="{FF2B5EF4-FFF2-40B4-BE49-F238E27FC236}">
+                <a16:creationId xmlns:a16="http://schemas.microsoft.com/office/drawing/2014/main" id="{7B7CB26B-C966-00E9-6199-CC0380A0783E}"/>
+              </a:ext>
+            </a:extLst>
+          </p:cNvPr>
+          <p:cNvSpPr txBox="1"/>
+          <p:nvPr/>
+        </p:nvSpPr>
+        <p:spPr>
+          <a:xfrm>
+            <a:off x="4490368" y="1741906"/>
+            <a:ext cx="1275244" cy="369332"/>
+          </a:xfrm>
+          <a:prstGeom prst="rect">
+            <a:avLst/>
+          </a:prstGeom>
+          <a:noFill/>
+        </p:spPr>
+        <p:txBody>
+          <a:bodyPr wrap="square" rtlCol="0">
+            <a:spAutoFit/>
+          </a:bodyPr>
+          <a:lstStyle/>
+          <a:p>
+            <a:r>
+              <a:rPr lang="en-US" dirty="0"/>
+              <a:t>Validation</a:t>
+            </a:r>
+          </a:p>
+        </p:txBody>
+      </p:sp>
+      <p:sp>
+        <p:nvSpPr>
+          <p:cNvPr id="10" name="TextBox 9">
+            <a:extLst>
+              <a:ext uri="{FF2B5EF4-FFF2-40B4-BE49-F238E27FC236}">
+                <a16:creationId xmlns:a16="http://schemas.microsoft.com/office/drawing/2014/main" id="{8CB3FC99-182F-628B-6F86-D9693A087232}"/>
+              </a:ext>
+            </a:extLst>
+          </p:cNvPr>
+          <p:cNvSpPr txBox="1"/>
+          <p:nvPr/>
+        </p:nvSpPr>
+        <p:spPr>
+          <a:xfrm>
+            <a:off x="4471247" y="4379383"/>
+            <a:ext cx="1261255" cy="369332"/>
+          </a:xfrm>
+          <a:prstGeom prst="rect">
+            <a:avLst/>
+          </a:prstGeom>
+          <a:noFill/>
+        </p:spPr>
+        <p:txBody>
+          <a:bodyPr wrap="square" rtlCol="0">
+            <a:spAutoFit/>
+          </a:bodyPr>
+          <a:lstStyle/>
+          <a:p>
+            <a:r>
+              <a:rPr lang="en-US" dirty="0"/>
+              <a:t>Fine tuning</a:t>
+            </a:r>
+          </a:p>
+        </p:txBody>
+      </p:sp>
+      <p:pic>
+        <p:nvPicPr>
+          <p:cNvPr id="12" name="Picture 11">
+            <a:extLst>
+              <a:ext uri="{FF2B5EF4-FFF2-40B4-BE49-F238E27FC236}">
+                <a16:creationId xmlns:a16="http://schemas.microsoft.com/office/drawing/2014/main" id="{67D28751-49B9-3E1E-C603-E58288C222AF}"/>
+              </a:ext>
+            </a:extLst>
+          </p:cNvPr>
+          <p:cNvPicPr>
+            <a:picLocks noChangeAspect="1"/>
+          </p:cNvPicPr>
+          <p:nvPr/>
+        </p:nvPicPr>
+        <p:blipFill>
+          <a:blip r:embed="rId6"/>
+          <a:stretch>
+            <a:fillRect/>
+          </a:stretch>
+        </p:blipFill>
+        <p:spPr>
+          <a:xfrm>
+            <a:off x="6171879" y="420635"/>
+            <a:ext cx="3410426" cy="809738"/>
+          </a:xfrm>
+          <a:prstGeom prst="rect">
+            <a:avLst/>
+          </a:prstGeom>
+        </p:spPr>
+      </p:pic>
+      <p:pic>
+        <p:nvPicPr>
+          <p:cNvPr id="18" name="Picture 17">
+            <a:extLst>
+              <a:ext uri="{FF2B5EF4-FFF2-40B4-BE49-F238E27FC236}">
+                <a16:creationId xmlns:a16="http://schemas.microsoft.com/office/drawing/2014/main" id="{778D5819-5C1D-2975-6FD3-AE463CEF8331}"/>
+              </a:ext>
+            </a:extLst>
+          </p:cNvPr>
+          <p:cNvPicPr>
+            <a:picLocks noChangeAspect="1"/>
+          </p:cNvPicPr>
+          <p:nvPr/>
+        </p:nvPicPr>
+        <p:blipFill>
+          <a:blip r:embed="rId7"/>
+          <a:stretch>
+            <a:fillRect/>
+          </a:stretch>
+        </p:blipFill>
+        <p:spPr>
+          <a:xfrm>
+            <a:off x="795905" y="456349"/>
+            <a:ext cx="3362794" cy="790685"/>
+          </a:xfrm>
+          <a:prstGeom prst="rect">
+            <a:avLst/>
+          </a:prstGeom>
+        </p:spPr>
+      </p:pic>
+      <p:sp>
+        <p:nvSpPr>
+          <p:cNvPr id="19" name="Arrow: Right 18">
+            <a:extLst>
+              <a:ext uri="{FF2B5EF4-FFF2-40B4-BE49-F238E27FC236}">
+                <a16:creationId xmlns:a16="http://schemas.microsoft.com/office/drawing/2014/main" id="{EEA72BD3-45EA-2ED9-920E-E9306657DFD7}"/>
+              </a:ext>
+            </a:extLst>
+          </p:cNvPr>
+          <p:cNvSpPr/>
+          <p:nvPr/>
+        </p:nvSpPr>
+        <p:spPr>
+          <a:xfrm>
+            <a:off x="4633525" y="681310"/>
+            <a:ext cx="1132087" cy="340762"/>
+          </a:xfrm>
+          <a:prstGeom prst="rightArrow">
+            <a:avLst/>
+          </a:prstGeom>
+        </p:spPr>
+        <p:style>
+          <a:lnRef idx="2">
+            <a:schemeClr val="accent1">
+              <a:shade val="15000"/>
+            </a:schemeClr>
+          </a:lnRef>
+          <a:fillRef idx="1">
+            <a:schemeClr val="accent1"/>
+          </a:fillRef>
+          <a:effectRef idx="0">
+            <a:schemeClr val="accent1"/>
+          </a:effectRef>
+          <a:fontRef idx="minor">
+            <a:schemeClr val="lt1"/>
+          </a:fontRef>
+        </p:style>
+        <p:txBody>
+          <a:bodyPr rtlCol="0" anchor="ctr"/>
+          <a:lstStyle/>
+          <a:p>
+            <a:pPr algn="ctr"/>
+            <a:endParaRPr lang="en-US"/>
+          </a:p>
+        </p:txBody>
+      </p:sp>
+      <p:pic>
+        <p:nvPicPr>
+          <p:cNvPr id="23" name="Picture 22">
+            <a:extLst>
+              <a:ext uri="{FF2B5EF4-FFF2-40B4-BE49-F238E27FC236}">
+                <a16:creationId xmlns:a16="http://schemas.microsoft.com/office/drawing/2014/main" id="{D3B1C227-4D57-6EAC-47D5-41D2D3EBEDDF}"/>
+              </a:ext>
+            </a:extLst>
+          </p:cNvPr>
+          <p:cNvPicPr>
+            <a:picLocks noChangeAspect="1"/>
+          </p:cNvPicPr>
+          <p:nvPr/>
+        </p:nvPicPr>
+        <p:blipFill>
+          <a:blip r:embed="rId8"/>
+          <a:stretch>
+            <a:fillRect/>
+          </a:stretch>
+        </p:blipFill>
+        <p:spPr>
+          <a:xfrm>
+            <a:off x="860411" y="4564049"/>
+            <a:ext cx="3170900" cy="1434351"/>
           </a:xfrm>
           <a:prstGeom prst="rect">
             <a:avLst/>
@@ -13307,7 +13600,7 @@
         </p:spPr>
         <p:txBody>
           <a:bodyPr>
-            <a:normAutofit fontScale="85000" lnSpcReduction="20000"/>
+            <a:normAutofit fontScale="70000" lnSpcReduction="20000"/>
           </a:bodyPr>
           <a:lstStyle/>
           <a:p>
@@ -13347,7 +13640,7 @@
             </a:pPr>
             <a:r>
               <a:rPr lang="en-US" dirty="0"/>
-              <a:t>Model selection process: predicting on the test set with the best estimator per examined model (best estimators fitted with best chosen parameters as returned by a grid search), and then choosing the best performing model according to the classification report</a:t>
+              <a:t>Model selection process: predicting on the test set with the best estimator per examined model (best estimators fitted with best chosen parameters as returned by a grid search), and then choosing the best performing model(s) according to the classification reports</a:t>
             </a:r>
           </a:p>
           <a:p>
@@ -13357,17 +13650,30 @@
             </a:pPr>
             <a:r>
               <a:rPr lang="en-US" dirty="0"/>
-              <a:t>The SVM classifier has the best f1 and recall scores, without overfitting, compared to all other examined models</a:t>
-            </a:r>
-          </a:p>
-          <a:p>
-            <a:pPr marL="285750" indent="-285750">
-              <a:buFont typeface="Wingdings" panose="05000000000000000000" pitchFamily="2" charset="2"/>
-              <a:buChar char="q"/>
-            </a:pPr>
+              <a:t>The SVM classifier has the best f1 and recall scores, without overfitting, compared to all other examined models. Then follows XGBClassifier</a:t>
+            </a:r>
+          </a:p>
+          <a:p>
+            <a:pPr marL="742950" lvl="2" indent="-285750"/>
             <a:r>
               <a:rPr lang="en-US" dirty="0"/>
-              <a:t> Fine tuning selected SVM model </a:t>
+              <a:t>SVM  with recall (on malignant label) of 96% and f1 (on malignant label) of 97%</a:t>
+            </a:r>
+          </a:p>
+          <a:p>
+            <a:pPr marL="742950" lvl="2" indent="-285750"/>
+            <a:r>
+              <a:rPr lang="en-US" dirty="0"/>
+              <a:t>XGBClassifier  with recall (on malignant label) of 96% and f1 (on malignant label) of 98%</a:t>
+            </a:r>
+          </a:p>
+          <a:p>
+            <a:br>
+              <a:rPr lang="en-US" dirty="0"/>
+            </a:br>
+            <a:r>
+              <a:rPr lang="en-US" dirty="0"/>
+              <a:t> Fine tuning selected SVM and XGBClassifier models </a:t>
             </a:r>
           </a:p>
           <a:p>

</xml_diff>